<commit_message>
Adding a slide about research in the era of LLMs
</commit_message>
<xml_diff>
--- a/slides/2024_Delphi_NLP_with_ML_Part_2.pptx
+++ b/slides/2024_Delphi_NLP_with_ML_Part_2.pptx
@@ -8,9 +8,10 @@
     <p:sldId id="256" r:id="rId2"/>
     <p:sldId id="276" r:id="rId3"/>
     <p:sldId id="281" r:id="rId4"/>
-    <p:sldId id="278" r:id="rId5"/>
-    <p:sldId id="279" r:id="rId6"/>
-    <p:sldId id="280" r:id="rId7"/>
+    <p:sldId id="282" r:id="rId5"/>
+    <p:sldId id="278" r:id="rId6"/>
+    <p:sldId id="279" r:id="rId7"/>
+    <p:sldId id="280" r:id="rId8"/>
   </p:sldIdLst>
   <p:sldSz cx="12192000" cy="6858000"/>
   <p:notesSz cx="6858000" cy="9144000"/>
@@ -305,7 +306,7 @@
           <a:p>
             <a:fld id="{3299B5C5-5143-40F9-BF92-26F12C515E3E}" type="datetimeFigureOut">
               <a:rPr lang="en-US" smtClean="0"/>
-              <a:t>2/6/2024</a:t>
+              <a:t>3/7/2024</a:t>
             </a:fld>
             <a:endParaRPr lang="en-US"/>
           </a:p>
@@ -643,7 +644,7 @@
           <a:p>
             <a:fld id="{3299B5C5-5143-40F9-BF92-26F12C515E3E}" type="datetimeFigureOut">
               <a:rPr lang="en-US" smtClean="0"/>
-              <a:t>2/6/2024</a:t>
+              <a:t>3/7/2024</a:t>
             </a:fld>
             <a:endParaRPr lang="en-US"/>
           </a:p>
@@ -1044,7 +1045,7 @@
           <a:p>
             <a:fld id="{3299B5C5-5143-40F9-BF92-26F12C515E3E}" type="datetimeFigureOut">
               <a:rPr lang="en-US" smtClean="0"/>
-              <a:t>2/6/2024</a:t>
+              <a:t>3/7/2024</a:t>
             </a:fld>
             <a:endParaRPr lang="en-US"/>
           </a:p>
@@ -1380,7 +1381,7 @@
           <a:p>
             <a:fld id="{3299B5C5-5143-40F9-BF92-26F12C515E3E}" type="datetimeFigureOut">
               <a:rPr lang="en-US" smtClean="0"/>
-              <a:t>2/6/2024</a:t>
+              <a:t>3/7/2024</a:t>
             </a:fld>
             <a:endParaRPr lang="en-US"/>
           </a:p>
@@ -1700,7 +1701,7 @@
           <a:p>
             <a:fld id="{3299B5C5-5143-40F9-BF92-26F12C515E3E}" type="datetimeFigureOut">
               <a:rPr lang="en-US" smtClean="0"/>
-              <a:t>2/6/2024</a:t>
+              <a:t>3/7/2024</a:t>
             </a:fld>
             <a:endParaRPr lang="en-US"/>
           </a:p>
@@ -2096,7 +2097,7 @@
           <a:p>
             <a:fld id="{3299B5C5-5143-40F9-BF92-26F12C515E3E}" type="datetimeFigureOut">
               <a:rPr lang="en-US" smtClean="0"/>
-              <a:t>2/6/2024</a:t>
+              <a:t>3/7/2024</a:t>
             </a:fld>
             <a:endParaRPr lang="en-US"/>
           </a:p>
@@ -2353,7 +2354,7 @@
           <a:p>
             <a:fld id="{3299B5C5-5143-40F9-BF92-26F12C515E3E}" type="datetimeFigureOut">
               <a:rPr lang="en-US" smtClean="0"/>
-              <a:t>2/6/2024</a:t>
+              <a:t>3/7/2024</a:t>
             </a:fld>
             <a:endParaRPr lang="en-US"/>
           </a:p>
@@ -2615,7 +2616,7 @@
           <a:p>
             <a:fld id="{3299B5C5-5143-40F9-BF92-26F12C515E3E}" type="datetimeFigureOut">
               <a:rPr lang="en-US" smtClean="0"/>
-              <a:t>2/6/2024</a:t>
+              <a:t>3/7/2024</a:t>
             </a:fld>
             <a:endParaRPr lang="en-US"/>
           </a:p>
@@ -2877,7 +2878,7 @@
           <a:p>
             <a:fld id="{3299B5C5-5143-40F9-BF92-26F12C515E3E}" type="datetimeFigureOut">
               <a:rPr lang="en-US" smtClean="0"/>
-              <a:t>2/6/2024</a:t>
+              <a:t>3/7/2024</a:t>
             </a:fld>
             <a:endParaRPr lang="en-US"/>
           </a:p>
@@ -3206,7 +3207,7 @@
           <a:p>
             <a:fld id="{3299B5C5-5143-40F9-BF92-26F12C515E3E}" type="datetimeFigureOut">
               <a:rPr lang="en-US" smtClean="0"/>
-              <a:t>2/6/2024</a:t>
+              <a:t>3/7/2024</a:t>
             </a:fld>
             <a:endParaRPr lang="en-US"/>
           </a:p>
@@ -3529,7 +3530,7 @@
           <a:p>
             <a:fld id="{3299B5C5-5143-40F9-BF92-26F12C515E3E}" type="datetimeFigureOut">
               <a:rPr lang="en-US" smtClean="0"/>
-              <a:t>2/6/2024</a:t>
+              <a:t>3/7/2024</a:t>
             </a:fld>
             <a:endParaRPr lang="en-US"/>
           </a:p>
@@ -3986,7 +3987,7 @@
           <a:p>
             <a:fld id="{3299B5C5-5143-40F9-BF92-26F12C515E3E}" type="datetimeFigureOut">
               <a:rPr lang="en-US" smtClean="0"/>
-              <a:t>2/6/2024</a:t>
+              <a:t>3/7/2024</a:t>
             </a:fld>
             <a:endParaRPr lang="en-US"/>
           </a:p>
@@ -4191,7 +4192,7 @@
           <a:p>
             <a:fld id="{3299B5C5-5143-40F9-BF92-26F12C515E3E}" type="datetimeFigureOut">
               <a:rPr lang="en-US" smtClean="0"/>
-              <a:t>2/6/2024</a:t>
+              <a:t>3/7/2024</a:t>
             </a:fld>
             <a:endParaRPr lang="en-US"/>
           </a:p>
@@ -4368,7 +4369,7 @@
           <a:p>
             <a:fld id="{3299B5C5-5143-40F9-BF92-26F12C515E3E}" type="datetimeFigureOut">
               <a:rPr lang="en-US" smtClean="0"/>
-              <a:t>2/6/2024</a:t>
+              <a:t>3/7/2024</a:t>
             </a:fld>
             <a:endParaRPr lang="en-US"/>
           </a:p>
@@ -4701,7 +4702,7 @@
           <a:p>
             <a:fld id="{3299B5C5-5143-40F9-BF92-26F12C515E3E}" type="datetimeFigureOut">
               <a:rPr lang="en-US" smtClean="0"/>
-              <a:t>2/6/2024</a:t>
+              <a:t>3/7/2024</a:t>
             </a:fld>
             <a:endParaRPr lang="en-US"/>
           </a:p>
@@ -5046,7 +5047,7 @@
           <a:p>
             <a:fld id="{3299B5C5-5143-40F9-BF92-26F12C515E3E}" type="datetimeFigureOut">
               <a:rPr lang="en-US" smtClean="0"/>
-              <a:t>2/6/2024</a:t>
+              <a:t>3/7/2024</a:t>
             </a:fld>
             <a:endParaRPr lang="en-US"/>
           </a:p>
@@ -7163,7 +7164,7 @@
           <a:p>
             <a:fld id="{3299B5C5-5143-40F9-BF92-26F12C515E3E}" type="datetimeFigureOut">
               <a:rPr lang="en-US" smtClean="0"/>
-              <a:t>2/6/2024</a:t>
+              <a:t>3/7/2024</a:t>
             </a:fld>
             <a:endParaRPr lang="en-US"/>
           </a:p>
@@ -8033,6 +8034,164 @@
   <p:cSld>
     <p:spTree>
       <p:nvGrpSpPr>
+        <p:cNvPr id="1" name=""/>
+        <p:cNvGrpSpPr/>
+        <p:nvPr/>
+      </p:nvGrpSpPr>
+      <p:grpSpPr>
+        <a:xfrm>
+          <a:off x="0" y="0"/>
+          <a:ext cx="0" cy="0"/>
+          <a:chOff x="0" y="0"/>
+          <a:chExt cx="0" cy="0"/>
+        </a:xfrm>
+      </p:grpSpPr>
+      <p:sp>
+        <p:nvSpPr>
+          <p:cNvPr id="2" name="Title 1">
+            <a:extLst>
+              <a:ext uri="{FF2B5EF4-FFF2-40B4-BE49-F238E27FC236}">
+                <a16:creationId xmlns:a16="http://schemas.microsoft.com/office/drawing/2014/main" id="{8399572C-AA70-ADD1-61F3-62F9CB185C92}"/>
+              </a:ext>
+            </a:extLst>
+          </p:cNvPr>
+          <p:cNvSpPr>
+            <a:spLocks noGrp="1"/>
+          </p:cNvSpPr>
+          <p:nvPr>
+            <p:ph type="title"/>
+          </p:nvPr>
+        </p:nvSpPr>
+        <p:spPr/>
+        <p:txBody>
+          <a:bodyPr/>
+          <a:lstStyle/>
+          <a:p>
+            <a:r>
+              <a:rPr lang="en-US" dirty="0"/>
+              <a:t>Is there still NLP research now that we have LLMs?</a:t>
+            </a:r>
+          </a:p>
+        </p:txBody>
+      </p:sp>
+      <p:sp>
+        <p:nvSpPr>
+          <p:cNvPr id="7" name="TextBox 6">
+            <a:extLst>
+              <a:ext uri="{FF2B5EF4-FFF2-40B4-BE49-F238E27FC236}">
+                <a16:creationId xmlns:a16="http://schemas.microsoft.com/office/drawing/2014/main" id="{DF1B7B45-CD72-BF8A-8DD9-E478537E6086}"/>
+              </a:ext>
+            </a:extLst>
+          </p:cNvPr>
+          <p:cNvSpPr txBox="1"/>
+          <p:nvPr/>
+        </p:nvSpPr>
+        <p:spPr>
+          <a:xfrm>
+            <a:off x="2466906" y="6065301"/>
+            <a:ext cx="9130844" cy="646331"/>
+          </a:xfrm>
+          <a:prstGeom prst="rect">
+            <a:avLst/>
+          </a:prstGeom>
+          <a:noFill/>
+        </p:spPr>
+        <p:txBody>
+          <a:bodyPr wrap="square" rtlCol="0">
+            <a:spAutoFit/>
+          </a:bodyPr>
+          <a:lstStyle/>
+          <a:p>
+            <a:r>
+              <a:rPr lang="en-US" dirty="0">
+                <a:hlinkClick r:id="rId2"/>
+              </a:rPr>
+              <a:t>https://arxiv.org/pdf/2310.20633.pdf</a:t>
+            </a:r>
+            <a:endParaRPr lang="en-US" dirty="0"/>
+          </a:p>
+          <a:p>
+            <a:endParaRPr lang="en-US" dirty="0"/>
+          </a:p>
+        </p:txBody>
+      </p:sp>
+      <p:pic>
+        <p:nvPicPr>
+          <p:cNvPr id="9" name="Picture 8">
+            <a:extLst>
+              <a:ext uri="{FF2B5EF4-FFF2-40B4-BE49-F238E27FC236}">
+                <a16:creationId xmlns:a16="http://schemas.microsoft.com/office/drawing/2014/main" id="{92BF46A7-5CDB-C36E-28A9-804E7A01E81D}"/>
+              </a:ext>
+            </a:extLst>
+          </p:cNvPr>
+          <p:cNvPicPr>
+            <a:picLocks noChangeAspect="1"/>
+          </p:cNvPicPr>
+          <p:nvPr/>
+        </p:nvPicPr>
+        <p:blipFill>
+          <a:blip r:embed="rId3"/>
+          <a:stretch>
+            <a:fillRect/>
+          </a:stretch>
+        </p:blipFill>
+        <p:spPr>
+          <a:xfrm>
+            <a:off x="3915097" y="1979521"/>
+            <a:ext cx="4361805" cy="3855410"/>
+          </a:xfrm>
+          <a:prstGeom prst="rect">
+            <a:avLst/>
+          </a:prstGeom>
+          <a:solidFill>
+            <a:srgbClr val="FFFFFF">
+              <a:shade val="85000"/>
+            </a:srgbClr>
+          </a:solidFill>
+          <a:ln w="190500" cap="rnd">
+            <a:solidFill>
+              <a:srgbClr val="FFFFFF"/>
+            </a:solidFill>
+          </a:ln>
+          <a:effectLst>
+            <a:outerShdw blurRad="50000" algn="tl" rotWithShape="0">
+              <a:srgbClr val="000000">
+                <a:alpha val="41000"/>
+              </a:srgbClr>
+            </a:outerShdw>
+          </a:effectLst>
+          <a:scene3d>
+            <a:camera prst="orthographicFront"/>
+            <a:lightRig rig="twoPt" dir="t">
+              <a:rot lat="0" lon="0" rev="7800000"/>
+            </a:lightRig>
+          </a:scene3d>
+          <a:sp3d contourW="6350">
+            <a:bevelT w="50800" h="16510"/>
+            <a:contourClr>
+              <a:srgbClr val="C0C0C0"/>
+            </a:contourClr>
+          </a:sp3d>
+        </p:spPr>
+      </p:pic>
+    </p:spTree>
+    <p:extLst>
+      <p:ext uri="{BB962C8B-B14F-4D97-AF65-F5344CB8AC3E}">
+        <p14:creationId xmlns:p14="http://schemas.microsoft.com/office/powerpoint/2010/main" val="1434254415"/>
+      </p:ext>
+    </p:extLst>
+  </p:cSld>
+  <p:clrMapOvr>
+    <a:masterClrMapping/>
+  </p:clrMapOvr>
+</p:sld>
+</file>
+
+<file path=ppt/slides/slide5.xml><?xml version="1.0" encoding="utf-8"?>
+<p:sld xmlns:a="http://schemas.openxmlformats.org/drawingml/2006/main" xmlns:r="http://schemas.openxmlformats.org/officeDocument/2006/relationships" xmlns:p="http://schemas.openxmlformats.org/presentationml/2006/main">
+  <p:cSld>
+    <p:spTree>
+      <p:nvGrpSpPr>
         <p:cNvPr id="1" name="">
           <a:extLst>
             <a:ext uri="{FF2B5EF4-FFF2-40B4-BE49-F238E27FC236}">
@@ -8214,7 +8373,7 @@
 </p:sld>
 </file>
 
-<file path=ppt/slides/slide5.xml><?xml version="1.0" encoding="utf-8"?>
+<file path=ppt/slides/slide6.xml><?xml version="1.0" encoding="utf-8"?>
 <p:sld xmlns:a="http://schemas.openxmlformats.org/drawingml/2006/main" xmlns:r="http://schemas.openxmlformats.org/officeDocument/2006/relationships" xmlns:p="http://schemas.openxmlformats.org/presentationml/2006/main">
   <p:cSld>
     <p:spTree>
@@ -8385,7 +8544,7 @@
 </p:sld>
 </file>
 
-<file path=ppt/slides/slide6.xml><?xml version="1.0" encoding="utf-8"?>
+<file path=ppt/slides/slide7.xml><?xml version="1.0" encoding="utf-8"?>
 <p:sld xmlns:a="http://schemas.openxmlformats.org/drawingml/2006/main" xmlns:r="http://schemas.openxmlformats.org/officeDocument/2006/relationships" xmlns:p="http://schemas.openxmlformats.org/presentationml/2006/main">
   <p:cSld>
     <p:spTree>

</xml_diff>